<commit_message>
Add log parsing code.
</commit_message>
<xml_diff>
--- a/poster/poster_rough.pptx
+++ b/poster/poster_rough.pptx
@@ -32458,7 +32458,7 @@
           <a:graphicData uri="http://schemas.openxmlformats.org/presentationml/2006/ole">
             <mc:AlternateContent xmlns:mc="http://schemas.openxmlformats.org/markup-compatibility/2006">
               <mc:Choice xmlns:v="urn:schemas-microsoft-com:vml" Requires="v">
-                <p:oleObj spid="_x0000_s2618" name="Equation" r:id="rId19" imgW="1536480" imgH="431640" progId="Equation.DSMT4">
+                <p:oleObj spid="_x0000_s2634" name="Equation" r:id="rId19" imgW="1536480" imgH="431640" progId="Equation.DSMT4">
                   <p:embed/>
                 </p:oleObj>
               </mc:Choice>
@@ -32511,7 +32511,7 @@
           <a:graphicData uri="http://schemas.openxmlformats.org/presentationml/2006/ole">
             <mc:AlternateContent xmlns:mc="http://schemas.openxmlformats.org/markup-compatibility/2006">
               <mc:Choice xmlns:v="urn:schemas-microsoft-com:vml" Requires="v">
-                <p:oleObj spid="_x0000_s2619" name="Equation" r:id="rId21" imgW="1981080" imgH="482400" progId="Equation.DSMT4">
+                <p:oleObj spid="_x0000_s2635" name="Equation" r:id="rId21" imgW="1981080" imgH="482400" progId="Equation.DSMT4">
                   <p:embed/>
                 </p:oleObj>
               </mc:Choice>
@@ -36266,7 +36266,7 @@
           <a:graphicData uri="http://schemas.openxmlformats.org/presentationml/2006/ole">
             <mc:AlternateContent xmlns:mc="http://schemas.openxmlformats.org/markup-compatibility/2006">
               <mc:Choice xmlns:v="urn:schemas-microsoft-com:vml" Requires="v">
-                <p:oleObj spid="_x0000_s2620" name="Equation" r:id="rId26" imgW="812520" imgH="241200" progId="Equation.DSMT4">
+                <p:oleObj spid="_x0000_s2636" name="Equation" r:id="rId26" imgW="812520" imgH="241200" progId="Equation.DSMT4">
                   <p:embed/>
                 </p:oleObj>
               </mc:Choice>
@@ -36319,7 +36319,7 @@
           <a:graphicData uri="http://schemas.openxmlformats.org/presentationml/2006/ole">
             <mc:AlternateContent xmlns:mc="http://schemas.openxmlformats.org/markup-compatibility/2006">
               <mc:Choice xmlns:v="urn:schemas-microsoft-com:vml" Requires="v">
-                <p:oleObj spid="_x0000_s2621" name="Equation" r:id="rId28" imgW="876240" imgH="431640" progId="Equation.DSMT4">
+                <p:oleObj spid="_x0000_s2637" name="Equation" r:id="rId28" imgW="876240" imgH="431640" progId="Equation.DSMT4">
                   <p:embed/>
                 </p:oleObj>
               </mc:Choice>
@@ -36372,7 +36372,7 @@
           <a:graphicData uri="http://schemas.openxmlformats.org/presentationml/2006/ole">
             <mc:AlternateContent xmlns:mc="http://schemas.openxmlformats.org/markup-compatibility/2006">
               <mc:Choice xmlns:v="urn:schemas-microsoft-com:vml" Requires="v">
-                <p:oleObj spid="_x0000_s2622" name="Equation" r:id="rId30" imgW="1384200" imgH="317160" progId="Equation.DSMT4">
+                <p:oleObj spid="_x0000_s2638" name="Equation" r:id="rId30" imgW="1384200" imgH="317160" progId="Equation.DSMT4">
                   <p:embed/>
                 </p:oleObj>
               </mc:Choice>
@@ -36425,7 +36425,7 @@
           <a:graphicData uri="http://schemas.openxmlformats.org/presentationml/2006/ole">
             <mc:AlternateContent xmlns:mc="http://schemas.openxmlformats.org/markup-compatibility/2006">
               <mc:Choice xmlns:v="urn:schemas-microsoft-com:vml" Requires="v">
-                <p:oleObj spid="_x0000_s2623" name="Equation" r:id="rId32" imgW="1981080" imgH="482400" progId="Equation.DSMT4">
+                <p:oleObj spid="_x0000_s2639" name="Equation" r:id="rId32" imgW="1981080" imgH="482400" progId="Equation.DSMT4">
                   <p:embed/>
                 </p:oleObj>
               </mc:Choice>
@@ -36478,7 +36478,7 @@
           <a:graphicData uri="http://schemas.openxmlformats.org/presentationml/2006/ole">
             <mc:AlternateContent xmlns:mc="http://schemas.openxmlformats.org/markup-compatibility/2006">
               <mc:Choice xmlns:v="urn:schemas-microsoft-com:vml" Requires="v">
-                <p:oleObj spid="_x0000_s2624" name="Equation" r:id="rId34" imgW="1536480" imgH="444240" progId="Equation.DSMT4">
+                <p:oleObj spid="_x0000_s2640" name="Equation" r:id="rId34" imgW="1536480" imgH="444240" progId="Equation.DSMT4">
                   <p:embed/>
                 </p:oleObj>
               </mc:Choice>
@@ -36538,7 +36538,7 @@
           <a:graphicData uri="http://schemas.openxmlformats.org/presentationml/2006/ole">
             <mc:AlternateContent xmlns:mc="http://schemas.openxmlformats.org/markup-compatibility/2006">
               <mc:Choice xmlns:v="urn:schemas-microsoft-com:vml" Requires="v">
-                <p:oleObj spid="_x0000_s2625" name="Equation" r:id="rId36" imgW="1333440" imgH="431640" progId="Equation.DSMT4">
+                <p:oleObj spid="_x0000_s2641" name="Equation" r:id="rId36" imgW="1333440" imgH="431640" progId="Equation.DSMT4">
                   <p:embed/>
                 </p:oleObj>
               </mc:Choice>

</xml_diff>